<commit_message>
fixed misc typos in M03 slides
</commit_message>
<xml_diff>
--- a/Slides/Module 03 Code-Level Design Principles.pptx
+++ b/Slides/Module 03 Code-Level Design Principles.pptx
@@ -153,7 +153,7 @@
 <file path=ppt/revisionInfo.xml><?xml version="1.0" encoding="utf-8"?>
 <p1510:revInfo xmlns:a="http://schemas.openxmlformats.org/drawingml/2006/main" xmlns:r="http://schemas.openxmlformats.org/officeDocument/2006/relationships" xmlns:p1510="http://schemas.microsoft.com/office/powerpoint/2015/10/main">
   <p1510:revLst>
-    <p1510:client id="{1B3D1EA2-D633-4A89-BCEE-7757CCB4FD42}" v="2" dt="2023-01-07T17:10:47.559"/>
+    <p1510:client id="{AD6466CF-1D05-4372-95BC-7089371C5C94}" v="2" dt="2023-01-23T20:08:19.858"/>
   </p1510:revLst>
 </p1510:revInfo>
 </file>
@@ -899,6 +899,207 @@
     </pc:docChg>
   </pc:docChgLst>
   <pc:docChgLst>
+    <pc:chgData name="Mitchell Wand" userId="de9b44c55c049659" providerId="LiveId" clId="{AD6466CF-1D05-4372-95BC-7089371C5C94}"/>
+    <pc:docChg chg="modSld">
+      <pc:chgData name="Mitchell Wand" userId="de9b44c55c049659" providerId="LiveId" clId="{AD6466CF-1D05-4372-95BC-7089371C5C94}" dt="2023-01-23T20:10:58.486" v="76" actId="20577"/>
+      <pc:docMkLst>
+        <pc:docMk/>
+      </pc:docMkLst>
+      <pc:sldChg chg="modSp mod">
+        <pc:chgData name="Mitchell Wand" userId="de9b44c55c049659" providerId="LiveId" clId="{AD6466CF-1D05-4372-95BC-7089371C5C94}" dt="2023-01-23T20:08:10.967" v="0" actId="14100"/>
+        <pc:sldMkLst>
+          <pc:docMk/>
+          <pc:sldMk cId="915762083" sldId="361"/>
+        </pc:sldMkLst>
+        <pc:spChg chg="mod">
+          <ac:chgData name="Mitchell Wand" userId="de9b44c55c049659" providerId="LiveId" clId="{AD6466CF-1D05-4372-95BC-7089371C5C94}" dt="2023-01-23T20:08:10.967" v="0" actId="14100"/>
+          <ac:spMkLst>
+            <pc:docMk/>
+            <pc:sldMk cId="915762083" sldId="361"/>
+            <ac:spMk id="6" creationId="{7129AFE6-2303-4CE4-8200-A004DD436F97}"/>
+          </ac:spMkLst>
+        </pc:spChg>
+      </pc:sldChg>
+      <pc:sldChg chg="modSp">
+        <pc:chgData name="Mitchell Wand" userId="de9b44c55c049659" providerId="LiveId" clId="{AD6466CF-1D05-4372-95BC-7089371C5C94}" dt="2023-01-23T20:08:19.858" v="2" actId="20577"/>
+        <pc:sldMkLst>
+          <pc:docMk/>
+          <pc:sldMk cId="3247464670" sldId="362"/>
+        </pc:sldMkLst>
+        <pc:spChg chg="mod">
+          <ac:chgData name="Mitchell Wand" userId="de9b44c55c049659" providerId="LiveId" clId="{AD6466CF-1D05-4372-95BC-7089371C5C94}" dt="2023-01-23T20:08:19.858" v="2" actId="20577"/>
+          <ac:spMkLst>
+            <pc:docMk/>
+            <pc:sldMk cId="3247464670" sldId="362"/>
+            <ac:spMk id="6" creationId="{AEB2F578-F41C-42BE-A746-B411D0AE37EB}"/>
+          </ac:spMkLst>
+        </pc:spChg>
+      </pc:sldChg>
+      <pc:sldChg chg="modSp mod">
+        <pc:chgData name="Mitchell Wand" userId="de9b44c55c049659" providerId="LiveId" clId="{AD6466CF-1D05-4372-95BC-7089371C5C94}" dt="2023-01-23T20:08:49.998" v="9" actId="20577"/>
+        <pc:sldMkLst>
+          <pc:docMk/>
+          <pc:sldMk cId="3947735393" sldId="365"/>
+        </pc:sldMkLst>
+        <pc:spChg chg="mod">
+          <ac:chgData name="Mitchell Wand" userId="de9b44c55c049659" providerId="LiveId" clId="{AD6466CF-1D05-4372-95BC-7089371C5C94}" dt="2023-01-23T20:08:49.998" v="9" actId="20577"/>
+          <ac:spMkLst>
+            <pc:docMk/>
+            <pc:sldMk cId="3947735393" sldId="365"/>
+            <ac:spMk id="7" creationId="{A694B6C8-5A57-35D8-E740-C16FA3796D1E}"/>
+          </ac:spMkLst>
+        </pc:spChg>
+      </pc:sldChg>
+      <pc:sldChg chg="modSp mod">
+        <pc:chgData name="Mitchell Wand" userId="de9b44c55c049659" providerId="LiveId" clId="{AD6466CF-1D05-4372-95BC-7089371C5C94}" dt="2023-01-23T20:09:35.924" v="34" actId="20577"/>
+        <pc:sldMkLst>
+          <pc:docMk/>
+          <pc:sldMk cId="2468871028" sldId="370"/>
+        </pc:sldMkLst>
+        <pc:spChg chg="mod">
+          <ac:chgData name="Mitchell Wand" userId="de9b44c55c049659" providerId="LiveId" clId="{AD6466CF-1D05-4372-95BC-7089371C5C94}" dt="2023-01-23T20:09:35.924" v="34" actId="20577"/>
+          <ac:spMkLst>
+            <pc:docMk/>
+            <pc:sldMk cId="2468871028" sldId="370"/>
+            <ac:spMk id="5" creationId="{9A240F55-B2AC-4A29-B17F-8DEA798DAAE4}"/>
+          </ac:spMkLst>
+        </pc:spChg>
+      </pc:sldChg>
+      <pc:sldChg chg="modSp mod">
+        <pc:chgData name="Mitchell Wand" userId="de9b44c55c049659" providerId="LiveId" clId="{AD6466CF-1D05-4372-95BC-7089371C5C94}" dt="2023-01-23T20:09:56.370" v="36" actId="20577"/>
+        <pc:sldMkLst>
+          <pc:docMk/>
+          <pc:sldMk cId="1017021096" sldId="371"/>
+        </pc:sldMkLst>
+        <pc:spChg chg="mod">
+          <ac:chgData name="Mitchell Wand" userId="de9b44c55c049659" providerId="LiveId" clId="{AD6466CF-1D05-4372-95BC-7089371C5C94}" dt="2023-01-23T20:09:56.370" v="36" actId="20577"/>
+          <ac:spMkLst>
+            <pc:docMk/>
+            <pc:sldMk cId="1017021096" sldId="371"/>
+            <ac:spMk id="3" creationId="{752C0810-2FED-46EB-82B7-B2730F69E5BB}"/>
+          </ac:spMkLst>
+        </pc:spChg>
+      </pc:sldChg>
+      <pc:sldChg chg="modSp mod">
+        <pc:chgData name="Mitchell Wand" userId="de9b44c55c049659" providerId="LiveId" clId="{AD6466CF-1D05-4372-95BC-7089371C5C94}" dt="2023-01-23T20:10:35.781" v="66" actId="20577"/>
+        <pc:sldMkLst>
+          <pc:docMk/>
+          <pc:sldMk cId="4285197496" sldId="374"/>
+        </pc:sldMkLst>
+        <pc:spChg chg="mod">
+          <ac:chgData name="Mitchell Wand" userId="de9b44c55c049659" providerId="LiveId" clId="{AD6466CF-1D05-4372-95BC-7089371C5C94}" dt="2023-01-23T20:10:13.976" v="39" actId="20577"/>
+          <ac:spMkLst>
+            <pc:docMk/>
+            <pc:sldMk cId="4285197496" sldId="374"/>
+            <ac:spMk id="2" creationId="{1078B5ED-089E-4E03-AE7A-2333C7AF4560}"/>
+          </ac:spMkLst>
+        </pc:spChg>
+        <pc:spChg chg="mod">
+          <ac:chgData name="Mitchell Wand" userId="de9b44c55c049659" providerId="LiveId" clId="{AD6466CF-1D05-4372-95BC-7089371C5C94}" dt="2023-01-23T20:10:29.660" v="57" actId="20577"/>
+          <ac:spMkLst>
+            <pc:docMk/>
+            <pc:sldMk cId="4285197496" sldId="374"/>
+            <ac:spMk id="5" creationId="{F1372F46-A124-4B14-8F16-E2C13171ECB3}"/>
+          </ac:spMkLst>
+        </pc:spChg>
+        <pc:spChg chg="mod">
+          <ac:chgData name="Mitchell Wand" userId="de9b44c55c049659" providerId="LiveId" clId="{AD6466CF-1D05-4372-95BC-7089371C5C94}" dt="2023-01-23T20:10:35.781" v="66" actId="20577"/>
+          <ac:spMkLst>
+            <pc:docMk/>
+            <pc:sldMk cId="4285197496" sldId="374"/>
+            <ac:spMk id="6" creationId="{0F71FA50-933F-4201-87ED-4334941A29AD}"/>
+          </ac:spMkLst>
+        </pc:spChg>
+      </pc:sldChg>
+      <pc:sldChg chg="modSp mod">
+        <pc:chgData name="Mitchell Wand" userId="de9b44c55c049659" providerId="LiveId" clId="{AD6466CF-1D05-4372-95BC-7089371C5C94}" dt="2023-01-23T20:10:58.486" v="76" actId="20577"/>
+        <pc:sldMkLst>
+          <pc:docMk/>
+          <pc:sldMk cId="2659888623" sldId="375"/>
+        </pc:sldMkLst>
+        <pc:spChg chg="mod">
+          <ac:chgData name="Mitchell Wand" userId="de9b44c55c049659" providerId="LiveId" clId="{AD6466CF-1D05-4372-95BC-7089371C5C94}" dt="2023-01-23T20:10:58.486" v="76" actId="20577"/>
+          <ac:spMkLst>
+            <pc:docMk/>
+            <pc:sldMk cId="2659888623" sldId="375"/>
+            <ac:spMk id="5" creationId="{8736CE8B-3D4E-4A1D-A9EF-4C9EFEAD593A}"/>
+          </ac:spMkLst>
+        </pc:spChg>
+      </pc:sldChg>
+      <pc:sldChg chg="modSp mod">
+        <pc:chgData name="Mitchell Wand" userId="de9b44c55c049659" providerId="LiveId" clId="{AD6466CF-1D05-4372-95BC-7089371C5C94}" dt="2023-01-23T20:09:02.432" v="12" actId="20577"/>
+        <pc:sldMkLst>
+          <pc:docMk/>
+          <pc:sldMk cId="2869151381" sldId="494"/>
+        </pc:sldMkLst>
+        <pc:spChg chg="mod">
+          <ac:chgData name="Mitchell Wand" userId="de9b44c55c049659" providerId="LiveId" clId="{AD6466CF-1D05-4372-95BC-7089371C5C94}" dt="2023-01-23T20:09:02.432" v="12" actId="20577"/>
+          <ac:spMkLst>
+            <pc:docMk/>
+            <pc:sldMk cId="2869151381" sldId="494"/>
+            <ac:spMk id="5" creationId="{7A7CE241-579A-C00B-2C03-8055423915D5}"/>
+          </ac:spMkLst>
+        </pc:spChg>
+      </pc:sldChg>
+    </pc:docChg>
+  </pc:docChgLst>
+  <pc:docChgLst>
+    <pc:chgData name="Mitchell Wand" userId="de9b44c55c049659" providerId="LiveId" clId="{99718308-7C56-473B-8B2B-53B03B1B7395}"/>
+    <pc:docChg chg="undo custSel addSld modSld">
+      <pc:chgData name="Mitchell Wand" userId="de9b44c55c049659" providerId="LiveId" clId="{99718308-7C56-473B-8B2B-53B03B1B7395}" dt="2022-09-14T18:51:01.402" v="704" actId="27636"/>
+      <pc:docMkLst>
+        <pc:docMk/>
+      </pc:docMkLst>
+      <pc:sldChg chg="addSp modSp add mod modAnim modNotesTx">
+        <pc:chgData name="Mitchell Wand" userId="de9b44c55c049659" providerId="LiveId" clId="{99718308-7C56-473B-8B2B-53B03B1B7395}" dt="2022-09-14T18:51:01.402" v="704" actId="27636"/>
+        <pc:sldMkLst>
+          <pc:docMk/>
+          <pc:sldMk cId="3605028067" sldId="495"/>
+        </pc:sldMkLst>
+        <pc:spChg chg="mod">
+          <ac:chgData name="Mitchell Wand" userId="de9b44c55c049659" providerId="LiveId" clId="{99718308-7C56-473B-8B2B-53B03B1B7395}" dt="2022-09-14T18:40:45.997" v="75" actId="20577"/>
+          <ac:spMkLst>
+            <pc:docMk/>
+            <pc:sldMk cId="3605028067" sldId="495"/>
+            <ac:spMk id="2" creationId="{BA745527-D100-4B4F-829D-1B696CAF1C9B}"/>
+          </ac:spMkLst>
+        </pc:spChg>
+        <pc:spChg chg="mod">
+          <ac:chgData name="Mitchell Wand" userId="de9b44c55c049659" providerId="LiveId" clId="{99718308-7C56-473B-8B2B-53B03B1B7395}" dt="2022-09-14T18:51:01.402" v="704" actId="27636"/>
+          <ac:spMkLst>
+            <pc:docMk/>
+            <pc:sldMk cId="3605028067" sldId="495"/>
+            <ac:spMk id="3" creationId="{FCCE4D6C-6E60-4E4C-BE55-5674B33BAD01}"/>
+          </ac:spMkLst>
+        </pc:spChg>
+        <pc:spChg chg="mod">
+          <ac:chgData name="Mitchell Wand" userId="de9b44c55c049659" providerId="LiveId" clId="{99718308-7C56-473B-8B2B-53B03B1B7395}" dt="2022-09-14T18:39:05.942" v="17" actId="255"/>
+          <ac:spMkLst>
+            <pc:docMk/>
+            <pc:sldMk cId="3605028067" sldId="495"/>
+            <ac:spMk id="5" creationId="{7A7CE241-579A-C00B-2C03-8055423915D5}"/>
+          </ac:spMkLst>
+        </pc:spChg>
+        <pc:spChg chg="mod">
+          <ac:chgData name="Mitchell Wand" userId="de9b44c55c049659" providerId="LiveId" clId="{99718308-7C56-473B-8B2B-53B03B1B7395}" dt="2022-09-14T18:39:17.321" v="20" actId="20577"/>
+          <ac:spMkLst>
+            <pc:docMk/>
+            <pc:sldMk cId="3605028067" sldId="495"/>
+            <ac:spMk id="6" creationId="{DDC06498-1D10-4E52-A107-990734307F51}"/>
+          </ac:spMkLst>
+        </pc:spChg>
+        <pc:spChg chg="add mod">
+          <ac:chgData name="Mitchell Wand" userId="de9b44c55c049659" providerId="LiveId" clId="{99718308-7C56-473B-8B2B-53B03B1B7395}" dt="2022-09-14T18:40:01.254" v="26" actId="255"/>
+          <ac:spMkLst>
+            <pc:docMk/>
+            <pc:sldMk cId="3605028067" sldId="495"/>
+            <ac:spMk id="11" creationId="{1B7168C4-C6D5-1024-A1FA-7A1C9E11C8D2}"/>
+          </ac:spMkLst>
+        </pc:spChg>
+      </pc:sldChg>
+    </pc:docChg>
+  </pc:docChgLst>
+  <pc:docChgLst>
     <pc:chgData name="Mitchell Wand" userId="de9b44c55c049659" providerId="LiveId" clId="{1B3D1EA2-D633-4A89-BCEE-7757CCB4FD42}"/>
     <pc:docChg chg="undo custSel modSld">
       <pc:chgData name="Mitchell Wand" userId="de9b44c55c049659" providerId="LiveId" clId="{1B3D1EA2-D633-4A89-BCEE-7757CCB4FD42}" dt="2023-01-07T17:13:38.282" v="157" actId="20577"/>
@@ -1064,62 +1265,6 @@
           <pc:docMk/>
           <pc:sldMk cId="3345968335" sldId="430"/>
         </pc:sldMkLst>
-      </pc:sldChg>
-    </pc:docChg>
-  </pc:docChgLst>
-  <pc:docChgLst>
-    <pc:chgData name="Mitchell Wand" userId="de9b44c55c049659" providerId="LiveId" clId="{99718308-7C56-473B-8B2B-53B03B1B7395}"/>
-    <pc:docChg chg="undo custSel addSld modSld">
-      <pc:chgData name="Mitchell Wand" userId="de9b44c55c049659" providerId="LiveId" clId="{99718308-7C56-473B-8B2B-53B03B1B7395}" dt="2022-09-14T18:51:01.402" v="704" actId="27636"/>
-      <pc:docMkLst>
-        <pc:docMk/>
-      </pc:docMkLst>
-      <pc:sldChg chg="addSp modSp add mod modAnim modNotesTx">
-        <pc:chgData name="Mitchell Wand" userId="de9b44c55c049659" providerId="LiveId" clId="{99718308-7C56-473B-8B2B-53B03B1B7395}" dt="2022-09-14T18:51:01.402" v="704" actId="27636"/>
-        <pc:sldMkLst>
-          <pc:docMk/>
-          <pc:sldMk cId="3605028067" sldId="495"/>
-        </pc:sldMkLst>
-        <pc:spChg chg="mod">
-          <ac:chgData name="Mitchell Wand" userId="de9b44c55c049659" providerId="LiveId" clId="{99718308-7C56-473B-8B2B-53B03B1B7395}" dt="2022-09-14T18:40:45.997" v="75" actId="20577"/>
-          <ac:spMkLst>
-            <pc:docMk/>
-            <pc:sldMk cId="3605028067" sldId="495"/>
-            <ac:spMk id="2" creationId="{BA745527-D100-4B4F-829D-1B696CAF1C9B}"/>
-          </ac:spMkLst>
-        </pc:spChg>
-        <pc:spChg chg="mod">
-          <ac:chgData name="Mitchell Wand" userId="de9b44c55c049659" providerId="LiveId" clId="{99718308-7C56-473B-8B2B-53B03B1B7395}" dt="2022-09-14T18:51:01.402" v="704" actId="27636"/>
-          <ac:spMkLst>
-            <pc:docMk/>
-            <pc:sldMk cId="3605028067" sldId="495"/>
-            <ac:spMk id="3" creationId="{FCCE4D6C-6E60-4E4C-BE55-5674B33BAD01}"/>
-          </ac:spMkLst>
-        </pc:spChg>
-        <pc:spChg chg="mod">
-          <ac:chgData name="Mitchell Wand" userId="de9b44c55c049659" providerId="LiveId" clId="{99718308-7C56-473B-8B2B-53B03B1B7395}" dt="2022-09-14T18:39:05.942" v="17" actId="255"/>
-          <ac:spMkLst>
-            <pc:docMk/>
-            <pc:sldMk cId="3605028067" sldId="495"/>
-            <ac:spMk id="5" creationId="{7A7CE241-579A-C00B-2C03-8055423915D5}"/>
-          </ac:spMkLst>
-        </pc:spChg>
-        <pc:spChg chg="mod">
-          <ac:chgData name="Mitchell Wand" userId="de9b44c55c049659" providerId="LiveId" clId="{99718308-7C56-473B-8B2B-53B03B1B7395}" dt="2022-09-14T18:39:17.321" v="20" actId="20577"/>
-          <ac:spMkLst>
-            <pc:docMk/>
-            <pc:sldMk cId="3605028067" sldId="495"/>
-            <ac:spMk id="6" creationId="{DDC06498-1D10-4E52-A107-990734307F51}"/>
-          </ac:spMkLst>
-        </pc:spChg>
-        <pc:spChg chg="add mod">
-          <ac:chgData name="Mitchell Wand" userId="de9b44c55c049659" providerId="LiveId" clId="{99718308-7C56-473B-8B2B-53B03B1B7395}" dt="2022-09-14T18:40:01.254" v="26" actId="255"/>
-          <ac:spMkLst>
-            <pc:docMk/>
-            <pc:sldMk cId="3605028067" sldId="495"/>
-            <ac:spMk id="11" creationId="{1B7168C4-C6D5-1024-A1FA-7A1C9E11C8D2}"/>
-          </ac:spMkLst>
-        </pc:spChg>
       </pc:sldChg>
     </pc:docChg>
   </pc:docChgLst>
@@ -4170,7 +4315,7 @@
           <a:p>
             <a:fld id="{7C7E5181-6CF5-45F7-A87A-E0E0B1FD7549}" type="datetimeFigureOut">
               <a:rPr lang="en-US" smtClean="0"/>
-              <a:t>1/7/2023</a:t>
+              <a:t>1/23/2023</a:t>
             </a:fld>
             <a:endParaRPr lang="en-US"/>
           </a:p>
@@ -8361,7 +8506,7 @@
           <a:p>
             <a:fld id="{5D2A64DE-480B-420F-9649-4F8E696E08E0}" type="datetime1">
               <a:rPr lang="en-US" smtClean="0"/>
-              <a:t>1/7/2023</a:t>
+              <a:t>1/23/2023</a:t>
             </a:fld>
             <a:endParaRPr lang="en-US"/>
           </a:p>
@@ -8595,7 +8740,7 @@
           <a:p>
             <a:fld id="{0D3616D0-8311-4107-9726-6B805E7D05BA}" type="datetime1">
               <a:rPr lang="en-US" smtClean="0"/>
-              <a:t>1/7/2023</a:t>
+              <a:t>1/23/2023</a:t>
             </a:fld>
             <a:endParaRPr lang="en-US"/>
           </a:p>
@@ -8803,7 +8948,7 @@
           <a:p>
             <a:fld id="{3BC2557A-5C88-417A-A763-5AC779462A5F}" type="datetime1">
               <a:rPr lang="en-US" smtClean="0"/>
-              <a:t>1/7/2023</a:t>
+              <a:t>1/23/2023</a:t>
             </a:fld>
             <a:endParaRPr lang="en-US"/>
           </a:p>
@@ -9327,7 +9472,7 @@
           <a:p>
             <a:fld id="{07C7BFD4-467E-4EDE-93EA-052F5B39A4E5}" type="datetime1">
               <a:rPr lang="en-US" smtClean="0"/>
-              <a:t>1/7/2023</a:t>
+              <a:t>1/23/2023</a:t>
             </a:fld>
             <a:endParaRPr lang="en-US"/>
           </a:p>
@@ -9640,7 +9785,7 @@
           <a:p>
             <a:fld id="{A533CBE2-D5BE-47AC-ADC2-9CDFC1D0CF90}" type="datetime1">
               <a:rPr lang="en-US" smtClean="0"/>
-              <a:t>1/7/2023</a:t>
+              <a:t>1/23/2023</a:t>
             </a:fld>
             <a:endParaRPr lang="en-US"/>
           </a:p>
@@ -9941,7 +10086,7 @@
           <a:p>
             <a:fld id="{39B7EDB1-CE74-4951-85A2-0B01C2128E28}" type="datetime1">
               <a:rPr lang="en-US" smtClean="0"/>
-              <a:t>1/7/2023</a:t>
+              <a:t>1/23/2023</a:t>
             </a:fld>
             <a:endParaRPr lang="en-US"/>
           </a:p>
@@ -10389,7 +10534,7 @@
           <a:p>
             <a:fld id="{2BC7EB92-A5C2-4807-A9DC-9EDE6CBFB241}" type="datetime1">
               <a:rPr lang="en-US" smtClean="0"/>
-              <a:t>1/7/2023</a:t>
+              <a:t>1/23/2023</a:t>
             </a:fld>
             <a:endParaRPr lang="en-US"/>
           </a:p>
@@ -10535,7 +10680,7 @@
           <a:p>
             <a:fld id="{109E55A0-C911-4F03-82FC-7E5926047D46}" type="datetime1">
               <a:rPr lang="en-US" smtClean="0"/>
-              <a:t>1/7/2023</a:t>
+              <a:t>1/23/2023</a:t>
             </a:fld>
             <a:endParaRPr lang="en-US"/>
           </a:p>
@@ -10684,7 +10829,7 @@
           <a:p>
             <a:fld id="{2B7B7EE0-7771-4CD5-9B2B-3550753A54A1}" type="datetime1">
               <a:rPr lang="en-US" smtClean="0"/>
-              <a:t>1/7/2023</a:t>
+              <a:t>1/23/2023</a:t>
             </a:fld>
             <a:endParaRPr lang="en-US"/>
           </a:p>
@@ -10995,7 +11140,7 @@
           <a:p>
             <a:fld id="{F8B318B3-0E87-4416-A9B8-D891968C2727}" type="datetime1">
               <a:rPr lang="en-US" smtClean="0"/>
-              <a:t>1/7/2023</a:t>
+              <a:t>1/23/2023</a:t>
             </a:fld>
             <a:endParaRPr lang="en-US"/>
           </a:p>
@@ -11283,7 +11428,7 @@
           <a:p>
             <a:fld id="{EA476A42-A091-4468-A075-64A31BE59948}" type="datetime1">
               <a:rPr lang="en-US" smtClean="0"/>
-              <a:t>1/7/2023</a:t>
+              <a:t>1/23/2023</a:t>
             </a:fld>
             <a:endParaRPr lang="en-US"/>
           </a:p>
@@ -11524,7 +11669,7 @@
           <a:p>
             <a:fld id="{54D997E8-DDEE-43F1-8D9B-F8A1E11DE488}" type="datetime1">
               <a:rPr lang="en-US" smtClean="0"/>
-              <a:t>1/7/2023</a:t>
+              <a:t>1/23/2023</a:t>
             </a:fld>
             <a:endParaRPr lang="en-US"/>
           </a:p>
@@ -12458,7 +12603,7 @@
         <p:spPr>
           <a:xfrm>
             <a:off x="838200" y="1852361"/>
-            <a:ext cx="2784231" cy="1569660"/>
+            <a:ext cx="3198541" cy="830997"/>
           </a:xfrm>
           <a:prstGeom prst="rect">
             <a:avLst/>
@@ -13222,7 +13367,7 @@
               <a:rPr lang="en-US" sz="2400" dirty="0" err="1">
                 <a:latin typeface="Consolas" panose="020B0609020204030204" pitchFamily="49" charset="0"/>
               </a:rPr>
-              <a:t>LineIsTooLong</a:t>
+              <a:t>lineIsTooLong</a:t>
             </a:r>
             <a:r>
               <a:rPr lang="en-US" sz="2400" dirty="0">
@@ -14569,7 +14714,7 @@
                 <a:effectLst/>
                 <a:latin typeface="Consolas" panose="020B0609020204030204" pitchFamily="49" charset="0"/>
               </a:rPr>
-              <a:t>const</a:t>
+              <a:t>let</a:t>
             </a:r>
             <a:r>
               <a:rPr lang="en-US" sz="2400" b="0" dirty="0">
@@ -15421,7 +15566,7 @@
                 <a:effectLst/>
                 <a:latin typeface="Consolas" panose="020B0609020204030204" pitchFamily="49" charset="0"/>
               </a:rPr>
-              <a:t>const</a:t>
+              <a:t>let</a:t>
             </a:r>
             <a:r>
               <a:rPr lang="en-US" b="0" dirty="0">
@@ -17934,7 +18079,7 @@
         <p:spPr>
           <a:xfrm>
             <a:off x="980048" y="1604618"/>
-            <a:ext cx="9546982" cy="3416320"/>
+            <a:ext cx="9546982" cy="3139321"/>
           </a:xfrm>
           <a:prstGeom prst="rect">
             <a:avLst/>
@@ -18063,36 +18208,7 @@
                 </a:solidFill>
                 <a:latin typeface="Consolas" panose="020B0609020204030204" pitchFamily="49" charset="0"/>
               </a:rPr>
-              <a:t>,</a:t>
-            </a:r>
-          </a:p>
-          <a:p>
-            <a:r>
-              <a:rPr lang="en-US" dirty="0">
-                <a:solidFill>
-                  <a:srgbClr val="000000"/>
-                </a:solidFill>
-                <a:latin typeface="Consolas" panose="020B0609020204030204" pitchFamily="49" charset="0"/>
-              </a:rPr>
-              <a:t>        </a:t>
-            </a:r>
-            <a:r>
-              <a:rPr lang="en-US" dirty="0">
-                <a:solidFill>
-                  <a:srgbClr val="0000FF"/>
-                </a:solidFill>
-                <a:latin typeface="Consolas" panose="020B0609020204030204" pitchFamily="49" charset="0"/>
-              </a:rPr>
-              <a:t>function</a:t>
-            </a:r>
-            <a:r>
-              <a:rPr lang="en-US" dirty="0">
-                <a:solidFill>
-                  <a:srgbClr val="000000"/>
-                </a:solidFill>
-                <a:latin typeface="Consolas" panose="020B0609020204030204" pitchFamily="49" charset="0"/>
-              </a:rPr>
-              <a:t> () { expect(</a:t>
+              <a:t>, () =&gt; { expect(</a:t>
             </a:r>
             <a:r>
               <a:rPr lang="en-US" dirty="0" err="1">
@@ -18809,12 +18925,6 @@
         <p:txBody>
           <a:bodyPr/>
           <a:lstStyle/>
-          <a:p>
-            <a:r>
-              <a:rPr lang="en-US" dirty="0"/>
-              <a:t>"No magic numbers" and "Don't Repeat Yourself" are already examples of this.</a:t>
-            </a:r>
-          </a:p>
           <a:p>
             <a:r>
               <a:rPr lang="en-US" dirty="0"/>
@@ -20444,7 +20554,7 @@
           <a:p>
             <a:r>
               <a:rPr lang="en-US" dirty="0"/>
-              <a:t>So const's represent our data differently</a:t>
+              <a:t>So let's represent our data differently</a:t>
             </a:r>
           </a:p>
         </p:txBody>
@@ -20529,7 +20639,7 @@
                 </a:solidFill>
                 <a:latin typeface="Consolas" panose="020B0609020204030204" pitchFamily="49" charset="0"/>
               </a:rPr>
-              <a:t>// if upper is null, then lower &lt; income  (no upper bound)</a:t>
+              <a:t>// if upper is undefined, then lower &lt; income  (no upper bound)</a:t>
             </a:r>
             <a:endParaRPr lang="en-US" dirty="0">
               <a:solidFill>
@@ -20595,7 +20705,7 @@
                 </a:solidFill>
                 <a:latin typeface="Consolas" panose="020B0609020204030204" pitchFamily="49" charset="0"/>
               </a:rPr>
-              <a:t>    upper: number | null,  </a:t>
+              <a:t>    upper: number | undefined,  </a:t>
             </a:r>
           </a:p>
           <a:p>
@@ -20998,7 +21108,7 @@
                 </a:solidFill>
                 <a:latin typeface="Consolas" panose="020B0609020204030204" pitchFamily="49" charset="0"/>
               </a:rPr>
-              <a:t>null</a:t>
+              <a:t>undefined</a:t>
             </a:r>
             <a:r>
               <a:rPr lang="en-US" dirty="0">
@@ -21326,25 +21436,25 @@
               <a:t>bracket.upper</a:t>
             </a:r>
             <a:r>
-              <a:rPr lang="en-US" dirty="0">
-                <a:solidFill>
-                  <a:srgbClr val="000000"/>
-                </a:solidFill>
-                <a:latin typeface="Consolas" panose="020B0609020204030204" pitchFamily="49" charset="0"/>
-              </a:rPr>
-              <a:t> == </a:t>
-            </a:r>
-            <a:r>
-              <a:rPr lang="en-US" dirty="0">
+              <a:rPr lang="en-US">
+                <a:solidFill>
+                  <a:srgbClr val="000000"/>
+                </a:solidFill>
+                <a:latin typeface="Consolas" panose="020B0609020204030204" pitchFamily="49" charset="0"/>
+              </a:rPr>
+              <a:t> === </a:t>
+            </a:r>
+            <a:r>
+              <a:rPr lang="en-US">
                 <a:solidFill>
                   <a:srgbClr val="0000FF"/>
                 </a:solidFill>
                 <a:latin typeface="Consolas" panose="020B0609020204030204" pitchFamily="49" charset="0"/>
               </a:rPr>
-              <a:t>null</a:t>
-            </a:r>
-            <a:r>
-              <a:rPr lang="en-US" dirty="0">
+              <a:t>undefined</a:t>
+            </a:r>
+            <a:r>
+              <a:rPr lang="en-US">
                 <a:solidFill>
                   <a:srgbClr val="000000"/>
                 </a:solidFill>
@@ -21352,6 +21462,12 @@
               </a:rPr>
               <a:t>) </a:t>
             </a:r>
+            <a:endParaRPr lang="en-US" dirty="0">
+              <a:solidFill>
+                <a:srgbClr val="000000"/>
+              </a:solidFill>
+              <a:latin typeface="Consolas" panose="020B0609020204030204" pitchFamily="49" charset="0"/>
+            </a:endParaRPr>
           </a:p>
           <a:p>
             <a:r>

</xml_diff>